<commit_message>
Signed-off-by: Steven Witkin <switkin1@jhu.edu>
</commit_message>
<xml_diff>
--- a/fscmodel presentation 130618.pptx
+++ b/fscmodel presentation 130618.pptx
@@ -954,7 +954,15 @@
         <a:p>
           <a:r>
             <a:rPr lang="en-US" dirty="0" smtClean="0"/>
-            <a:t>Input is read from a 5-sheet Excel workbook</a:t>
+            <a:t>Input is read from a </a:t>
+          </a:r>
+          <a:r>
+            <a:rPr lang="en-US" dirty="0" smtClean="0"/>
+            <a:t>6-sheet </a:t>
+          </a:r>
+          <a:r>
+            <a:rPr lang="en-US" dirty="0" smtClean="0"/>
+            <a:t>Excel workbook</a:t>
           </a:r>
           <a:endParaRPr lang="en-US" dirty="0"/>
         </a:p>
@@ -1308,22 +1316,22 @@
     </dgm:pt>
   </dgm:ptLst>
   <dgm:cxnLst>
+    <dgm:cxn modelId="{43EDADC4-178B-42DF-BFAD-914BCC588AB2}" type="presOf" srcId="{647250F8-7F9B-4740-9275-27AB3CC6E499}" destId="{73DB2240-4B46-474B-8865-097799547DD1}" srcOrd="1" destOrd="0" presId="urn:microsoft.com/office/officeart/2005/8/layout/process4"/>
+    <dgm:cxn modelId="{E0A27333-660C-446C-BB19-E42095094C1B}" srcId="{E07438AE-C096-4201-AF72-953A2A9A8421}" destId="{F9B90765-ECA5-4C4F-95CC-5591CB553B64}" srcOrd="0" destOrd="0" parTransId="{65F12596-5269-46D9-AC39-9670CB98047C}" sibTransId="{CBEC418A-67DB-4DA3-9900-AF13EBB70DBB}"/>
     <dgm:cxn modelId="{217F762E-9D96-4403-BB6A-DA9E031AC359}" type="presOf" srcId="{E07438AE-C096-4201-AF72-953A2A9A8421}" destId="{CC1FEBF8-32FA-4E1F-96D3-C79F4E9C112B}" srcOrd="0" destOrd="0" presId="urn:microsoft.com/office/officeart/2005/8/layout/process4"/>
+    <dgm:cxn modelId="{F290C630-7761-4107-A801-7A1DD01965F6}" srcId="{D8972D83-7534-487F-90F1-38F4CF38F914}" destId="{E07438AE-C096-4201-AF72-953A2A9A8421}" srcOrd="0" destOrd="0" parTransId="{1EB9BEDC-CBAE-4DFA-8A9D-B52F726D2478}" sibTransId="{9C6B2A1E-8C15-4849-AB20-65DE419B31BF}"/>
+    <dgm:cxn modelId="{B9A145D4-3D2C-4AB0-BA47-8725485A90B0}" srcId="{D8972D83-7534-487F-90F1-38F4CF38F914}" destId="{647250F8-7F9B-4740-9275-27AB3CC6E499}" srcOrd="2" destOrd="0" parTransId="{86AEB9EA-7EC4-4E8D-92B2-1F32DBEB9FF9}" sibTransId="{92790AC8-2917-41E9-A07B-D769665FB81E}"/>
+    <dgm:cxn modelId="{3E1DBA7B-13EA-4932-B3F1-3E3921BACD08}" type="presOf" srcId="{9823583F-E0A0-4E88-A13E-0C5982E3D495}" destId="{4551906C-F5BC-46EE-8AD4-9C2270498897}" srcOrd="1" destOrd="0" presId="urn:microsoft.com/office/officeart/2005/8/layout/process4"/>
+    <dgm:cxn modelId="{90EA3EE4-2AAD-4B20-A550-97EEDDB1BA42}" type="presOf" srcId="{A80A0390-61C8-42F0-A7CF-2C5E97D4FFC7}" destId="{C876CBB2-E766-4FE3-B12F-49ACCE41D7C6}" srcOrd="0" destOrd="0" presId="urn:microsoft.com/office/officeart/2005/8/layout/process4"/>
+    <dgm:cxn modelId="{A983D6F1-F992-4433-ACA0-55F04D63120D}" type="presOf" srcId="{F9B90765-ECA5-4C4F-95CC-5591CB553B64}" destId="{B2C51123-E39A-4E63-BF49-195128C17793}" srcOrd="0" destOrd="0" presId="urn:microsoft.com/office/officeart/2005/8/layout/process4"/>
+    <dgm:cxn modelId="{2EAC3FD2-3374-4789-ADF6-878B7D882AEB}" type="presOf" srcId="{D8972D83-7534-487F-90F1-38F4CF38F914}" destId="{2C954C16-FA7F-42D1-9595-C42350C6846F}" srcOrd="0" destOrd="0" presId="urn:microsoft.com/office/officeart/2005/8/layout/process4"/>
+    <dgm:cxn modelId="{0D2F29ED-538D-40D9-A856-D87413D9ACDF}" srcId="{9823583F-E0A0-4E88-A13E-0C5982E3D495}" destId="{21ECD0AF-7CF9-4D1B-BC49-5EF135039634}" srcOrd="0" destOrd="0" parTransId="{BF574295-2333-4D42-8982-DD44F46D0ED0}" sibTransId="{018392B4-D6A1-4213-AD0D-C6DBAC58F852}"/>
     <dgm:cxn modelId="{F560CDA1-0B21-41A5-9110-88ABC38C3DBE}" type="presOf" srcId="{9823583F-E0A0-4E88-A13E-0C5982E3D495}" destId="{EDCDDB6E-BDCC-401B-8426-EC30F75D841C}" srcOrd="0" destOrd="0" presId="urn:microsoft.com/office/officeart/2005/8/layout/process4"/>
-    <dgm:cxn modelId="{3E1DBA7B-13EA-4932-B3F1-3E3921BACD08}" type="presOf" srcId="{9823583F-E0A0-4E88-A13E-0C5982E3D495}" destId="{4551906C-F5BC-46EE-8AD4-9C2270498897}" srcOrd="1" destOrd="0" presId="urn:microsoft.com/office/officeart/2005/8/layout/process4"/>
-    <dgm:cxn modelId="{EAF627BC-3AAA-4997-9BE4-F56B1CA54298}" srcId="{D8972D83-7534-487F-90F1-38F4CF38F914}" destId="{9823583F-E0A0-4E88-A13E-0C5982E3D495}" srcOrd="1" destOrd="0" parTransId="{152A7BAD-AFEF-4358-9552-DC8948E53A0B}" sibTransId="{10C62146-6F25-4791-BD69-B8A8CAACA361}"/>
+    <dgm:cxn modelId="{AC0B591D-AE52-457C-8D6B-34D088EBCE47}" type="presOf" srcId="{647250F8-7F9B-4740-9275-27AB3CC6E499}" destId="{4945D051-362B-494E-874E-841D294FA261}" srcOrd="0" destOrd="0" presId="urn:microsoft.com/office/officeart/2005/8/layout/process4"/>
     <dgm:cxn modelId="{3FFF0501-DD57-41BE-9BBE-8B4A3AE9D7F1}" type="presOf" srcId="{21ECD0AF-7CF9-4D1B-BC49-5EF135039634}" destId="{10C86234-54DD-439E-83C2-B670A086214C}" srcOrd="0" destOrd="0" presId="urn:microsoft.com/office/officeart/2005/8/layout/process4"/>
     <dgm:cxn modelId="{0CAA70C0-4032-4BF6-A5FB-5C1ACB986EB6}" type="presOf" srcId="{E07438AE-C096-4201-AF72-953A2A9A8421}" destId="{928F6B9F-8134-4240-9783-CF653994FA86}" srcOrd="1" destOrd="0" presId="urn:microsoft.com/office/officeart/2005/8/layout/process4"/>
-    <dgm:cxn modelId="{2EAC3FD2-3374-4789-ADF6-878B7D882AEB}" type="presOf" srcId="{D8972D83-7534-487F-90F1-38F4CF38F914}" destId="{2C954C16-FA7F-42D1-9595-C42350C6846F}" srcOrd="0" destOrd="0" presId="urn:microsoft.com/office/officeart/2005/8/layout/process4"/>
-    <dgm:cxn modelId="{AC0B591D-AE52-457C-8D6B-34D088EBCE47}" type="presOf" srcId="{647250F8-7F9B-4740-9275-27AB3CC6E499}" destId="{4945D051-362B-494E-874E-841D294FA261}" srcOrd="0" destOrd="0" presId="urn:microsoft.com/office/officeart/2005/8/layout/process4"/>
-    <dgm:cxn modelId="{0D2F29ED-538D-40D9-A856-D87413D9ACDF}" srcId="{9823583F-E0A0-4E88-A13E-0C5982E3D495}" destId="{21ECD0AF-7CF9-4D1B-BC49-5EF135039634}" srcOrd="0" destOrd="0" parTransId="{BF574295-2333-4D42-8982-DD44F46D0ED0}" sibTransId="{018392B4-D6A1-4213-AD0D-C6DBAC58F852}"/>
-    <dgm:cxn modelId="{90EA3EE4-2AAD-4B20-A550-97EEDDB1BA42}" type="presOf" srcId="{A80A0390-61C8-42F0-A7CF-2C5E97D4FFC7}" destId="{C876CBB2-E766-4FE3-B12F-49ACCE41D7C6}" srcOrd="0" destOrd="0" presId="urn:microsoft.com/office/officeart/2005/8/layout/process4"/>
-    <dgm:cxn modelId="{B9A145D4-3D2C-4AB0-BA47-8725485A90B0}" srcId="{D8972D83-7534-487F-90F1-38F4CF38F914}" destId="{647250F8-7F9B-4740-9275-27AB3CC6E499}" srcOrd="2" destOrd="0" parTransId="{86AEB9EA-7EC4-4E8D-92B2-1F32DBEB9FF9}" sibTransId="{92790AC8-2917-41E9-A07B-D769665FB81E}"/>
-    <dgm:cxn modelId="{F290C630-7761-4107-A801-7A1DD01965F6}" srcId="{D8972D83-7534-487F-90F1-38F4CF38F914}" destId="{E07438AE-C096-4201-AF72-953A2A9A8421}" srcOrd="0" destOrd="0" parTransId="{1EB9BEDC-CBAE-4DFA-8A9D-B52F726D2478}" sibTransId="{9C6B2A1E-8C15-4849-AB20-65DE419B31BF}"/>
     <dgm:cxn modelId="{F7F96108-8307-4F6B-9B92-D4A627E58705}" srcId="{647250F8-7F9B-4740-9275-27AB3CC6E499}" destId="{A80A0390-61C8-42F0-A7CF-2C5E97D4FFC7}" srcOrd="0" destOrd="0" parTransId="{C69ABC8C-60B3-44C7-95F2-CBE68FB52F7F}" sibTransId="{8E0F6FE4-7BBC-46EA-95F6-FA21F5B41AB8}"/>
-    <dgm:cxn modelId="{A983D6F1-F992-4433-ACA0-55F04D63120D}" type="presOf" srcId="{F9B90765-ECA5-4C4F-95CC-5591CB553B64}" destId="{B2C51123-E39A-4E63-BF49-195128C17793}" srcOrd="0" destOrd="0" presId="urn:microsoft.com/office/officeart/2005/8/layout/process4"/>
-    <dgm:cxn modelId="{E0A27333-660C-446C-BB19-E42095094C1B}" srcId="{E07438AE-C096-4201-AF72-953A2A9A8421}" destId="{F9B90765-ECA5-4C4F-95CC-5591CB553B64}" srcOrd="0" destOrd="0" parTransId="{65F12596-5269-46D9-AC39-9670CB98047C}" sibTransId="{CBEC418A-67DB-4DA3-9900-AF13EBB70DBB}"/>
-    <dgm:cxn modelId="{43EDADC4-178B-42DF-BFAD-914BCC588AB2}" type="presOf" srcId="{647250F8-7F9B-4740-9275-27AB3CC6E499}" destId="{73DB2240-4B46-474B-8865-097799547DD1}" srcOrd="1" destOrd="0" presId="urn:microsoft.com/office/officeart/2005/8/layout/process4"/>
+    <dgm:cxn modelId="{EAF627BC-3AAA-4997-9BE4-F56B1CA54298}" srcId="{D8972D83-7534-487F-90F1-38F4CF38F914}" destId="{9823583F-E0A0-4E88-A13E-0C5982E3D495}" srcOrd="1" destOrd="0" parTransId="{152A7BAD-AFEF-4358-9552-DC8948E53A0B}" sibTransId="{10C62146-6F25-4791-BD69-B8A8CAACA361}"/>
     <dgm:cxn modelId="{6C9DC4EC-85CF-4087-94B7-8472E9FB024F}" type="presParOf" srcId="{2C954C16-FA7F-42D1-9595-C42350C6846F}" destId="{BAAFC947-1A75-48A6-BDC0-46C3F1514A27}" srcOrd="0" destOrd="0" presId="urn:microsoft.com/office/officeart/2005/8/layout/process4"/>
     <dgm:cxn modelId="{7BF80E65-C125-44E5-B7EF-D0E61270FC02}" type="presParOf" srcId="{BAAFC947-1A75-48A6-BDC0-46C3F1514A27}" destId="{4945D051-362B-494E-874E-841D294FA261}" srcOrd="0" destOrd="0" presId="urn:microsoft.com/office/officeart/2005/8/layout/process4"/>
     <dgm:cxn modelId="{3E448BB4-34D9-46BA-80B0-3C586C9A0F10}" type="presParOf" srcId="{BAAFC947-1A75-48A6-BDC0-46C3F1514A27}" destId="{73DB2240-4B46-474B-8865-097799547DD1}" srcOrd="1" destOrd="0" presId="urn:microsoft.com/office/officeart/2005/8/layout/process4"/>
@@ -1834,7 +1842,15 @@
           </a:pPr>
           <a:r>
             <a:rPr lang="en-US" sz="1900" kern="1200" dirty="0" smtClean="0"/>
-            <a:t>Input is read from a 5-sheet Excel workbook</a:t>
+            <a:t>Input is read from a </a:t>
+          </a:r>
+          <a:r>
+            <a:rPr lang="en-US" sz="1900" kern="1200" dirty="0" smtClean="0"/>
+            <a:t>6-sheet </a:t>
+          </a:r>
+          <a:r>
+            <a:rPr lang="en-US" sz="1900" kern="1200" dirty="0" smtClean="0"/>
+            <a:t>Excel workbook</a:t>
           </a:r>
           <a:endParaRPr lang="en-US" sz="1900" kern="1200" dirty="0"/>
         </a:p>
@@ -6435,7 +6451,7 @@
           <p:nvPr>
             <p:extLst>
               <p:ext uri="{D42A27DB-BD31-4B8C-83A1-F6EECF244321}">
-                <p14:modId xmlns:p14="http://schemas.microsoft.com/office/powerpoint/2010/main" val="3582958760"/>
+                <p14:modId xmlns:p14="http://schemas.microsoft.com/office/powerpoint/2010/main" val="2849895075"/>
               </p:ext>
             </p:extLst>
           </p:nvPr>
@@ -6562,25 +6578,39 @@
           <a:p>
             <a:r>
               <a:rPr lang="en-US" dirty="0" smtClean="0"/>
-              <a:t>Each class </a:t>
-            </a:r>
+              <a:t>Each class has a flexible number of inputs</a:t>
+            </a:r>
+          </a:p>
+          <a:p>
             <a:r>
               <a:rPr lang="en-US" dirty="0" smtClean="0"/>
-              <a:t>has a flexible number of </a:t>
+              <a:t>The attributes (name, energy type, etc.) of each instance of each class can be entered in the </a:t>
             </a:r>
             <a:r>
               <a:rPr lang="en-US" dirty="0" smtClean="0"/>
-              <a:t>inputs</a:t>
+              <a:t>spreadsheet </a:t>
             </a:r>
           </a:p>
           <a:p>
             <a:r>
               <a:rPr lang="en-US" dirty="0" smtClean="0"/>
-              <a:t>The</a:t>
+              <a:t>The restriction on CO</a:t>
+            </a:r>
+            <a:r>
+              <a:rPr lang="en-US" baseline="-25000" dirty="0" smtClean="0"/>
+              <a:t>2</a:t>
             </a:r>
             <a:r>
               <a:rPr lang="en-US" dirty="0" smtClean="0"/>
-              <a:t> attributes (name, energy type, etc.) of each instance of each class can be entered in the spreadsheet. </a:t>
+              <a:t> is entered into the 6</a:t>
+            </a:r>
+            <a:r>
+              <a:rPr lang="en-US" baseline="30000" dirty="0" smtClean="0"/>
+              <a:t>th</a:t>
+            </a:r>
+            <a:r>
+              <a:rPr lang="en-US" dirty="0" smtClean="0"/>
+              <a:t> sheet</a:t>
             </a:r>
             <a:endParaRPr lang="en-US" dirty="0" smtClean="0"/>
           </a:p>
@@ -6657,28 +6687,32 @@
           <a:lstStyle/>
           <a:p>
             <a:r>
-              <a:rPr lang="en-US" dirty="0" smtClean="0"/>
+              <a:rPr lang="en-US" sz="2400" dirty="0" smtClean="0"/>
               <a:t>Input is read from the spreadsheet using Pandas</a:t>
             </a:r>
           </a:p>
           <a:p>
             <a:r>
-              <a:rPr lang="en-US" dirty="0" smtClean="0"/>
-              <a:t>Lists of each class are constructed, containing all objects of that class</a:t>
-            </a:r>
-          </a:p>
-          <a:p>
-            <a:r>
-              <a:rPr lang="en-US" dirty="0" smtClean="0"/>
-              <a:t>This should be able to handle any number of each kind of component, as long as input format is correct</a:t>
-            </a:r>
-          </a:p>
-          <a:p>
-            <a:r>
-              <a:rPr lang="en-US" dirty="0" smtClean="0"/>
-              <a:t>CO2 restriction must be modified in the source code, not the input file</a:t>
-            </a:r>
-            <a:endParaRPr lang="en-US" dirty="0"/>
+              <a:rPr lang="en-US" sz="2400" dirty="0" smtClean="0"/>
+              <a:t>Lists of each class are constructed, containing all objects of that </a:t>
+            </a:r>
+            <a:r>
+              <a:rPr lang="en-US" sz="2400" dirty="0" smtClean="0"/>
+              <a:t>class</a:t>
+            </a:r>
+          </a:p>
+          <a:p>
+            <a:r>
+              <a:rPr lang="en-US" sz="2400" dirty="0" smtClean="0"/>
+              <a:t>The lists are then used to build the model</a:t>
+            </a:r>
+          </a:p>
+          <a:p>
+            <a:r>
+              <a:rPr lang="en-US" sz="2400" dirty="0" smtClean="0"/>
+              <a:t>The code checks that there are no spelling errors in the types of energy. More checks will be added.</a:t>
+            </a:r>
+            <a:endParaRPr lang="en-US" sz="2400" dirty="0" smtClean="0"/>
           </a:p>
         </p:txBody>
       </p:sp>
@@ -6756,14 +6790,40 @@
             </a:r>
             <a:r>
               <a:rPr lang="en-US" dirty="0" smtClean="0"/>
-              <a:t> uses the component lists to construct a linear or non-linear model</a:t>
-            </a:r>
-          </a:p>
-          <a:p>
+              <a:t> uses the component lists to construct </a:t>
+            </a:r>
             <a:r>
               <a:rPr lang="en-US" dirty="0" smtClean="0"/>
-              <a:t>While flexible, if new types of data are added to an existing component, or if new components are added, some minor changes will need to be made</a:t>
-            </a:r>
+              <a:t>variables and constraints which defines the model</a:t>
+            </a:r>
+            <a:endParaRPr lang="en-US" dirty="0" smtClean="0"/>
+          </a:p>
+          <a:p>
+            <a:r>
+              <a:rPr lang="en-US" dirty="0" smtClean="0"/>
+              <a:t>While flexible, if new </a:t>
+            </a:r>
+            <a:r>
+              <a:rPr lang="en-US" dirty="0" smtClean="0"/>
+              <a:t>types of data are </a:t>
+            </a:r>
+            <a:r>
+              <a:rPr lang="en-US" dirty="0" smtClean="0"/>
+              <a:t>added to an existing component, or if new </a:t>
+            </a:r>
+            <a:r>
+              <a:rPr lang="en-US" dirty="0" smtClean="0"/>
+              <a:t>types of components </a:t>
+            </a:r>
+            <a:r>
+              <a:rPr lang="en-US" dirty="0" smtClean="0"/>
+              <a:t>are added, some minor changes will need to be </a:t>
+            </a:r>
+            <a:r>
+              <a:rPr lang="en-US" dirty="0" smtClean="0"/>
+              <a:t>made</a:t>
+            </a:r>
+            <a:endParaRPr lang="en-US" dirty="0" smtClean="0"/>
           </a:p>
           <a:p>
             <a:r>
@@ -6772,7 +6832,21 @@
             </a:r>
             <a:r>
               <a:rPr lang="en-US" dirty="0" smtClean="0"/>
-              <a:t> is currently used as the model solver, but this is easily changeable</a:t>
+              <a:t> is currently used as the model </a:t>
+            </a:r>
+            <a:r>
+              <a:rPr lang="en-US" dirty="0" smtClean="0"/>
+              <a:t>solver</a:t>
+            </a:r>
+          </a:p>
+          <a:p>
+            <a:r>
+              <a:rPr lang="en-US" dirty="0" smtClean="0"/>
+              <a:t>Most of the model is linear, but some quadratic equations are needed for calculation of </a:t>
+            </a:r>
+            <a:r>
+              <a:rPr lang="en-US" dirty="0" err="1" smtClean="0"/>
+              <a:t>capex</a:t>
             </a:r>
             <a:endParaRPr lang="en-US" dirty="0"/>
           </a:p>
@@ -6860,7 +6934,15 @@
           <a:p>
             <a:r>
               <a:rPr lang="en-US" dirty="0" smtClean="0"/>
-              <a:t>Cost by fuel and CO2 by fuel are not currently implemented, but could be in the future</a:t>
+              <a:t>Cost by fuel and CO2 by fuel are not currently </a:t>
+            </a:r>
+            <a:r>
+              <a:rPr lang="en-US" dirty="0" smtClean="0"/>
+              <a:t>displayed, </a:t>
+            </a:r>
+            <a:r>
+              <a:rPr lang="en-US" dirty="0" smtClean="0"/>
+              <a:t>but could be in the future</a:t>
             </a:r>
           </a:p>
           <a:p>

</xml_diff>